<commit_message>
Updated State Data to go back further
</commit_message>
<xml_diff>
--- a/Posters/A Closer Look at how Non-Pharmaceutical Interventions Affect.pptx
+++ b/Posters/A Closer Look at how Non-Pharmaceutical Interventions Affect.pptx
@@ -104,6 +104,11 @@
       </a:defRPr>
     </a:lvl9pPr>
   </p:defaultTextStyle>
+  <p:extLst>
+    <p:ext uri="{EFAFB233-063F-42B5-8137-9DF3F51BA10A}">
+      <p15:sldGuideLst xmlns:p15="http://schemas.microsoft.com/office/powerpoint/2012/main"/>
+    </p:ext>
+  </p:extLst>
 </p:presentation>
 </file>
 
@@ -254,7 +259,7 @@
           <a:p>
             <a:fld id="{62BE2B66-B343-4A6F-9896-6FFEB2086BBB}" type="datetimeFigureOut">
               <a:rPr lang="en-US" smtClean="0"/>
-              <a:t>6/26/2021</a:t>
+              <a:t>6/29/2021</a:t>
             </a:fld>
             <a:endParaRPr lang="en-US"/>
           </a:p>
@@ -452,7 +457,7 @@
           <a:p>
             <a:fld id="{62BE2B66-B343-4A6F-9896-6FFEB2086BBB}" type="datetimeFigureOut">
               <a:rPr lang="en-US" smtClean="0"/>
-              <a:t>6/26/2021</a:t>
+              <a:t>6/29/2021</a:t>
             </a:fld>
             <a:endParaRPr lang="en-US"/>
           </a:p>
@@ -660,7 +665,7 @@
           <a:p>
             <a:fld id="{62BE2B66-B343-4A6F-9896-6FFEB2086BBB}" type="datetimeFigureOut">
               <a:rPr lang="en-US" smtClean="0"/>
-              <a:t>6/26/2021</a:t>
+              <a:t>6/29/2021</a:t>
             </a:fld>
             <a:endParaRPr lang="en-US"/>
           </a:p>
@@ -858,7 +863,7 @@
           <a:p>
             <a:fld id="{62BE2B66-B343-4A6F-9896-6FFEB2086BBB}" type="datetimeFigureOut">
               <a:rPr lang="en-US" smtClean="0"/>
-              <a:t>6/26/2021</a:t>
+              <a:t>6/29/2021</a:t>
             </a:fld>
             <a:endParaRPr lang="en-US"/>
           </a:p>
@@ -1133,7 +1138,7 @@
           <a:p>
             <a:fld id="{62BE2B66-B343-4A6F-9896-6FFEB2086BBB}" type="datetimeFigureOut">
               <a:rPr lang="en-US" smtClean="0"/>
-              <a:t>6/26/2021</a:t>
+              <a:t>6/29/2021</a:t>
             </a:fld>
             <a:endParaRPr lang="en-US"/>
           </a:p>
@@ -1398,7 +1403,7 @@
           <a:p>
             <a:fld id="{62BE2B66-B343-4A6F-9896-6FFEB2086BBB}" type="datetimeFigureOut">
               <a:rPr lang="en-US" smtClean="0"/>
-              <a:t>6/26/2021</a:t>
+              <a:t>6/29/2021</a:t>
             </a:fld>
             <a:endParaRPr lang="en-US"/>
           </a:p>
@@ -1810,7 +1815,7 @@
           <a:p>
             <a:fld id="{62BE2B66-B343-4A6F-9896-6FFEB2086BBB}" type="datetimeFigureOut">
               <a:rPr lang="en-US" smtClean="0"/>
-              <a:t>6/26/2021</a:t>
+              <a:t>6/29/2021</a:t>
             </a:fld>
             <a:endParaRPr lang="en-US"/>
           </a:p>
@@ -1951,7 +1956,7 @@
           <a:p>
             <a:fld id="{62BE2B66-B343-4A6F-9896-6FFEB2086BBB}" type="datetimeFigureOut">
               <a:rPr lang="en-US" smtClean="0"/>
-              <a:t>6/26/2021</a:t>
+              <a:t>6/29/2021</a:t>
             </a:fld>
             <a:endParaRPr lang="en-US"/>
           </a:p>
@@ -2064,7 +2069,7 @@
           <a:p>
             <a:fld id="{62BE2B66-B343-4A6F-9896-6FFEB2086BBB}" type="datetimeFigureOut">
               <a:rPr lang="en-US" smtClean="0"/>
-              <a:t>6/26/2021</a:t>
+              <a:t>6/29/2021</a:t>
             </a:fld>
             <a:endParaRPr lang="en-US"/>
           </a:p>
@@ -2375,7 +2380,7 @@
           <a:p>
             <a:fld id="{62BE2B66-B343-4A6F-9896-6FFEB2086BBB}" type="datetimeFigureOut">
               <a:rPr lang="en-US" smtClean="0"/>
-              <a:t>6/26/2021</a:t>
+              <a:t>6/29/2021</a:t>
             </a:fld>
             <a:endParaRPr lang="en-US"/>
           </a:p>
@@ -2663,7 +2668,7 @@
           <a:p>
             <a:fld id="{62BE2B66-B343-4A6F-9896-6FFEB2086BBB}" type="datetimeFigureOut">
               <a:rPr lang="en-US" smtClean="0"/>
-              <a:t>6/26/2021</a:t>
+              <a:t>6/29/2021</a:t>
             </a:fld>
             <a:endParaRPr lang="en-US"/>
           </a:p>
@@ -2904,7 +2909,7 @@
           <a:p>
             <a:fld id="{62BE2B66-B343-4A6F-9896-6FFEB2086BBB}" type="datetimeFigureOut">
               <a:rPr lang="en-US" smtClean="0"/>
-              <a:t>6/26/2021</a:t>
+              <a:t>6/29/2021</a:t>
             </a:fld>
             <a:endParaRPr lang="en-US"/>
           </a:p>
@@ -3627,7 +3632,7 @@
         <p:spPr>
           <a:xfrm>
             <a:off x="194344" y="3020037"/>
-            <a:ext cx="3369557" cy="307777"/>
+            <a:ext cx="3369557" cy="1600438"/>
           </a:xfrm>
           <a:prstGeom prst="rect">
             <a:avLst/>
@@ -3651,6 +3656,66 @@
               </a:rPr>
               <a:t>Methods/Approach</a:t>
             </a:r>
+          </a:p>
+          <a:p>
+            <a:pPr algn="ctr"/>
+            <a:endParaRPr lang="en-US" sz="1400" b="1" dirty="0">
+              <a:solidFill>
+                <a:schemeClr val="accent1">
+                  <a:lumMod val="75000"/>
+                </a:schemeClr>
+              </a:solidFill>
+            </a:endParaRPr>
+          </a:p>
+          <a:p>
+            <a:pPr algn="ctr"/>
+            <a:endParaRPr lang="en-US" sz="1400" b="1" dirty="0">
+              <a:solidFill>
+                <a:schemeClr val="accent1">
+                  <a:lumMod val="75000"/>
+                </a:schemeClr>
+              </a:solidFill>
+            </a:endParaRPr>
+          </a:p>
+          <a:p>
+            <a:pPr algn="ctr"/>
+            <a:endParaRPr lang="en-US" sz="1400" b="1" dirty="0">
+              <a:solidFill>
+                <a:schemeClr val="accent1">
+                  <a:lumMod val="75000"/>
+                </a:schemeClr>
+              </a:solidFill>
+            </a:endParaRPr>
+          </a:p>
+          <a:p>
+            <a:pPr algn="ctr"/>
+            <a:endParaRPr lang="en-US" sz="1400" b="1" dirty="0">
+              <a:solidFill>
+                <a:schemeClr val="accent1">
+                  <a:lumMod val="75000"/>
+                </a:schemeClr>
+              </a:solidFill>
+            </a:endParaRPr>
+          </a:p>
+          <a:p>
+            <a:pPr algn="ctr"/>
+            <a:endParaRPr lang="en-US" sz="1400" b="1" dirty="0">
+              <a:solidFill>
+                <a:schemeClr val="accent1">
+                  <a:lumMod val="75000"/>
+                </a:schemeClr>
+              </a:solidFill>
+            </a:endParaRPr>
+          </a:p>
+          <a:p>
+            <a:pPr algn="ctr"/>
+            <a:endParaRPr lang="en-US" sz="1400" b="1" dirty="0">
+              <a:solidFill>
+                <a:schemeClr val="accent1">
+                  <a:lumMod val="75000"/>
+                </a:schemeClr>
+              </a:solidFill>
+            </a:endParaRPr>
           </a:p>
         </p:txBody>
       </p:sp>
@@ -3858,6 +3923,36 @@
           </a:p>
         </p:txBody>
       </p:sp>
+      <p:pic>
+        <p:nvPicPr>
+          <p:cNvPr id="2" name="Picture 1">
+            <a:extLst>
+              <a:ext uri="{FF2B5EF4-FFF2-40B4-BE49-F238E27FC236}">
+                <a16:creationId xmlns:a16="http://schemas.microsoft.com/office/drawing/2014/main" id="{E0F0AEC0-1269-4829-93F0-17ACEEAC8EBF}"/>
+              </a:ext>
+            </a:extLst>
+          </p:cNvPr>
+          <p:cNvPicPr>
+            <a:picLocks noChangeAspect="1"/>
+          </p:cNvPicPr>
+          <p:nvPr/>
+        </p:nvPicPr>
+        <p:blipFill>
+          <a:blip r:embed="rId2"/>
+          <a:stretch>
+            <a:fillRect/>
+          </a:stretch>
+        </p:blipFill>
+        <p:spPr>
+          <a:xfrm>
+            <a:off x="1365269" y="3658394"/>
+            <a:ext cx="1027706" cy="476584"/>
+          </a:xfrm>
+          <a:prstGeom prst="rect">
+            <a:avLst/>
+          </a:prstGeom>
+        </p:spPr>
+      </p:pic>
     </p:spTree>
     <p:extLst>
       <p:ext uri="{BB962C8B-B14F-4D97-AF65-F5344CB8AC3E}">

</xml_diff>